<commit_message>
Added "Risikovermeidung" --> Changeing "Chancen_Risiko_Portfolio"
</commit_message>
<xml_diff>
--- a/documents/projectmanagement/Initialisierung/Chancen_Risiko_Portfolio.pptx
+++ b/documents/projectmanagement/Initialisierung/Chancen_Risiko_Portfolio.pptx
@@ -104,6 +104,11 @@
       </a:defRPr>
     </a:lvl9pPr>
   </p:defaultTextStyle>
+  <p:extLst>
+    <p:ext uri="{EFAFB233-063F-42B5-8137-9DF3F51BA10A}">
+      <p15:sldGuideLst xmlns:p15="http://schemas.microsoft.com/office/powerpoint/2012/main"/>
+    </p:ext>
+  </p:extLst>
 </p:presentation>
 </file>
 
@@ -152,7 +157,6 @@
               <a:rPr lang="de-DE"/>
               <a:t>Titelmasterformat durch Klicken bearbeiten</a:t>
             </a:r>
-            <a:endParaRPr lang="de-DE"/>
           </a:p>
         </p:txBody>
       </p:sp>
@@ -217,7 +221,6 @@
               <a:rPr lang="de-DE"/>
               <a:t>Formatvorlage des Untertitelmasters durch Klicken bearbeiten</a:t>
             </a:r>
-            <a:endParaRPr lang="de-DE"/>
           </a:p>
         </p:txBody>
       </p:sp>
@@ -238,7 +241,7 @@
           <a:p>
             <a:fld id="{65ABE77A-2990-41F9-9DAD-3980B7426935}" type="datetimeFigureOut">
               <a:rPr lang="de-DE" smtClean="0"/>
-              <a:t>13.07.2016</a:t>
+              <a:t>18.07.2016</a:t>
             </a:fld>
             <a:endParaRPr lang="de-DE"/>
           </a:p>
@@ -335,7 +338,6 @@
               <a:rPr lang="de-DE"/>
               <a:t>Titelmasterformat durch Klicken bearbeiten</a:t>
             </a:r>
-            <a:endParaRPr lang="de-DE"/>
           </a:p>
         </p:txBody>
       </p:sp>
@@ -387,7 +389,6 @@
               <a:rPr lang="de-DE"/>
               <a:t>Fünfte Ebene</a:t>
             </a:r>
-            <a:endParaRPr lang="de-DE"/>
           </a:p>
         </p:txBody>
       </p:sp>
@@ -408,7 +409,7 @@
           <a:p>
             <a:fld id="{65ABE77A-2990-41F9-9DAD-3980B7426935}" type="datetimeFigureOut">
               <a:rPr lang="de-DE" smtClean="0"/>
-              <a:t>13.07.2016</a:t>
+              <a:t>18.07.2016</a:t>
             </a:fld>
             <a:endParaRPr lang="de-DE"/>
           </a:p>
@@ -510,7 +511,6 @@
               <a:rPr lang="de-DE"/>
               <a:t>Titelmasterformat durch Klicken bearbeiten</a:t>
             </a:r>
-            <a:endParaRPr lang="de-DE"/>
           </a:p>
         </p:txBody>
       </p:sp>
@@ -567,7 +567,6 @@
               <a:rPr lang="de-DE"/>
               <a:t>Fünfte Ebene</a:t>
             </a:r>
-            <a:endParaRPr lang="de-DE"/>
           </a:p>
         </p:txBody>
       </p:sp>
@@ -588,7 +587,7 @@
           <a:p>
             <a:fld id="{65ABE77A-2990-41F9-9DAD-3980B7426935}" type="datetimeFigureOut">
               <a:rPr lang="de-DE" smtClean="0"/>
-              <a:t>13.07.2016</a:t>
+              <a:t>18.07.2016</a:t>
             </a:fld>
             <a:endParaRPr lang="de-DE"/>
           </a:p>
@@ -685,7 +684,6 @@
               <a:rPr lang="de-DE"/>
               <a:t>Titelmasterformat durch Klicken bearbeiten</a:t>
             </a:r>
-            <a:endParaRPr lang="de-DE"/>
           </a:p>
         </p:txBody>
       </p:sp>
@@ -737,7 +735,6 @@
               <a:rPr lang="de-DE"/>
               <a:t>Fünfte Ebene</a:t>
             </a:r>
-            <a:endParaRPr lang="de-DE"/>
           </a:p>
         </p:txBody>
       </p:sp>
@@ -758,7 +755,7 @@
           <a:p>
             <a:fld id="{65ABE77A-2990-41F9-9DAD-3980B7426935}" type="datetimeFigureOut">
               <a:rPr lang="de-DE" smtClean="0"/>
-              <a:t>13.07.2016</a:t>
+              <a:t>18.07.2016</a:t>
             </a:fld>
             <a:endParaRPr lang="de-DE"/>
           </a:p>
@@ -864,7 +861,6 @@
               <a:rPr lang="de-DE"/>
               <a:t>Titelmasterformat durch Klicken bearbeiten</a:t>
             </a:r>
-            <a:endParaRPr lang="de-DE"/>
           </a:p>
         </p:txBody>
       </p:sp>
@@ -1004,7 +1000,7 @@
           <a:p>
             <a:fld id="{65ABE77A-2990-41F9-9DAD-3980B7426935}" type="datetimeFigureOut">
               <a:rPr lang="de-DE" smtClean="0"/>
-              <a:t>13.07.2016</a:t>
+              <a:t>18.07.2016</a:t>
             </a:fld>
             <a:endParaRPr lang="de-DE"/>
           </a:p>
@@ -1101,7 +1097,6 @@
               <a:rPr lang="de-DE"/>
               <a:t>Titelmasterformat durch Klicken bearbeiten</a:t>
             </a:r>
-            <a:endParaRPr lang="de-DE"/>
           </a:p>
         </p:txBody>
       </p:sp>
@@ -1158,7 +1153,6 @@
               <a:rPr lang="de-DE"/>
               <a:t>Fünfte Ebene</a:t>
             </a:r>
-            <a:endParaRPr lang="de-DE"/>
           </a:p>
         </p:txBody>
       </p:sp>
@@ -1215,7 +1209,6 @@
               <a:rPr lang="de-DE"/>
               <a:t>Fünfte Ebene</a:t>
             </a:r>
-            <a:endParaRPr lang="de-DE"/>
           </a:p>
         </p:txBody>
       </p:sp>
@@ -1236,7 +1229,7 @@
           <a:p>
             <a:fld id="{65ABE77A-2990-41F9-9DAD-3980B7426935}" type="datetimeFigureOut">
               <a:rPr lang="de-DE" smtClean="0"/>
-              <a:t>13.07.2016</a:t>
+              <a:t>18.07.2016</a:t>
             </a:fld>
             <a:endParaRPr lang="de-DE"/>
           </a:p>
@@ -1338,7 +1331,6 @@
               <a:rPr lang="de-DE"/>
               <a:t>Titelmasterformat durch Klicken bearbeiten</a:t>
             </a:r>
-            <a:endParaRPr lang="de-DE"/>
           </a:p>
         </p:txBody>
       </p:sp>
@@ -1460,7 +1452,6 @@
               <a:rPr lang="de-DE"/>
               <a:t>Fünfte Ebene</a:t>
             </a:r>
-            <a:endParaRPr lang="de-DE"/>
           </a:p>
         </p:txBody>
       </p:sp>
@@ -1582,7 +1573,6 @@
               <a:rPr lang="de-DE"/>
               <a:t>Fünfte Ebene</a:t>
             </a:r>
-            <a:endParaRPr lang="de-DE"/>
           </a:p>
         </p:txBody>
       </p:sp>
@@ -1603,7 +1593,7 @@
           <a:p>
             <a:fld id="{65ABE77A-2990-41F9-9DAD-3980B7426935}" type="datetimeFigureOut">
               <a:rPr lang="de-DE" smtClean="0"/>
-              <a:t>13.07.2016</a:t>
+              <a:t>18.07.2016</a:t>
             </a:fld>
             <a:endParaRPr lang="de-DE"/>
           </a:p>
@@ -1700,7 +1690,6 @@
               <a:rPr lang="de-DE"/>
               <a:t>Titelmasterformat durch Klicken bearbeiten</a:t>
             </a:r>
-            <a:endParaRPr lang="de-DE"/>
           </a:p>
         </p:txBody>
       </p:sp>
@@ -1721,7 +1710,7 @@
           <a:p>
             <a:fld id="{65ABE77A-2990-41F9-9DAD-3980B7426935}" type="datetimeFigureOut">
               <a:rPr lang="de-DE" smtClean="0"/>
-              <a:t>13.07.2016</a:t>
+              <a:t>18.07.2016</a:t>
             </a:fld>
             <a:endParaRPr lang="de-DE"/>
           </a:p>
@@ -1816,7 +1805,7 @@
           <a:p>
             <a:fld id="{65ABE77A-2990-41F9-9DAD-3980B7426935}" type="datetimeFigureOut">
               <a:rPr lang="de-DE" smtClean="0"/>
-              <a:t>13.07.2016</a:t>
+              <a:t>18.07.2016</a:t>
             </a:fld>
             <a:endParaRPr lang="de-DE"/>
           </a:p>
@@ -1922,7 +1911,6 @@
               <a:rPr lang="de-DE"/>
               <a:t>Titelmasterformat durch Klicken bearbeiten</a:t>
             </a:r>
-            <a:endParaRPr lang="de-DE"/>
           </a:p>
         </p:txBody>
       </p:sp>
@@ -2007,7 +1995,6 @@
               <a:rPr lang="de-DE"/>
               <a:t>Fünfte Ebene</a:t>
             </a:r>
-            <a:endParaRPr lang="de-DE"/>
           </a:p>
         </p:txBody>
       </p:sp>
@@ -2093,7 +2080,7 @@
           <a:p>
             <a:fld id="{65ABE77A-2990-41F9-9DAD-3980B7426935}" type="datetimeFigureOut">
               <a:rPr lang="de-DE" smtClean="0"/>
-              <a:t>13.07.2016</a:t>
+              <a:t>18.07.2016</a:t>
             </a:fld>
             <a:endParaRPr lang="de-DE"/>
           </a:p>
@@ -2199,7 +2186,6 @@
               <a:rPr lang="de-DE"/>
               <a:t>Titelmasterformat durch Klicken bearbeiten</a:t>
             </a:r>
-            <a:endParaRPr lang="de-DE"/>
           </a:p>
         </p:txBody>
       </p:sp>
@@ -2346,7 +2332,7 @@
           <a:p>
             <a:fld id="{65ABE77A-2990-41F9-9DAD-3980B7426935}" type="datetimeFigureOut">
               <a:rPr lang="de-DE" smtClean="0"/>
-              <a:t>13.07.2016</a:t>
+              <a:t>18.07.2016</a:t>
             </a:fld>
             <a:endParaRPr lang="de-DE"/>
           </a:p>
@@ -2458,7 +2444,6 @@
               <a:rPr lang="de-DE"/>
               <a:t>Titelmasterformat durch Klicken bearbeiten</a:t>
             </a:r>
-            <a:endParaRPr lang="de-DE"/>
           </a:p>
         </p:txBody>
       </p:sp>
@@ -2520,7 +2505,6 @@
               <a:rPr lang="de-DE"/>
               <a:t>Fünfte Ebene</a:t>
             </a:r>
-            <a:endParaRPr lang="de-DE"/>
           </a:p>
         </p:txBody>
       </p:sp>
@@ -2559,7 +2543,7 @@
           <a:p>
             <a:fld id="{65ABE77A-2990-41F9-9DAD-3980B7426935}" type="datetimeFigureOut">
               <a:rPr lang="de-DE" smtClean="0"/>
-              <a:t>13.07.2016</a:t>
+              <a:t>18.07.2016</a:t>
             </a:fld>
             <a:endParaRPr lang="de-DE"/>
           </a:p>

</xml_diff>